<commit_message>
Update Ryan's dimensionality reduction slides
</commit_message>
<xml_diff>
--- a/dimensionality-reduction/ryan_henning/Dimensionality Reduction.pptx
+++ b/dimensionality-reduction/ryan_henning/Dimensionality Reduction.pptx
@@ -32,16 +32,17 @@
     <p:sldId id="277" r:id="rId26"/>
     <p:sldId id="278" r:id="rId27"/>
     <p:sldId id="279" r:id="rId28"/>
+    <p:sldId id="280" r:id="rId29"/>
   </p:sldIdLst>
   <p:sldSz cy="5143500" cx="9144000"/>
   <p:notesSz cx="6858000" cy="9144000"/>
   <p:embeddedFontLst>
     <p:embeddedFont>
       <p:font typeface="Roboto"/>
-      <p:regular r:id="rId29"/>
-      <p:bold r:id="rId30"/>
-      <p:italic r:id="rId31"/>
-      <p:boldItalic r:id="rId32"/>
+      <p:regular r:id="rId30"/>
+      <p:bold r:id="rId31"/>
+      <p:italic r:id="rId32"/>
+      <p:boldItalic r:id="rId33"/>
     </p:embeddedFont>
   </p:embeddedFontLst>
   <p:defaultTextStyle>
@@ -1975,6 +1976,47 @@
           </a:bodyPr>
           <a:lstStyle/>
           <a:p>
+            <a:pPr lvl="0" rtl="0">
+              <a:spcBef>
+                <a:spcPts val="0"/>
+              </a:spcBef>
+              <a:buNone/>
+            </a:pPr>
+            <a:r>
+              <a:rPr lang="en"/>
+              <a:t>Here’s a degenerate dataset that shows how PCA can screw you over.</a:t>
+            </a:r>
+          </a:p>
+          <a:p>
+            <a:pPr lvl="0" rtl="0">
+              <a:spcBef>
+                <a:spcPts val="0"/>
+              </a:spcBef>
+              <a:buNone/>
+            </a:pPr>
+            <a:r>
+              <a:rPr lang="en" u="sng">
+                <a:solidFill>
+                  <a:schemeClr val="hlink"/>
+                </a:solidFill>
+                <a:hlinkClick r:id="rId2"/>
+              </a:rPr>
+              <a:t>https://gist.github.com/lemonlaug/976543b650e53db24ab2</a:t>
+            </a:r>
+          </a:p>
+          <a:p>
+            <a:pPr lvl="0" rtl="0">
+              <a:spcBef>
+                <a:spcPts val="0"/>
+              </a:spcBef>
+              <a:buNone/>
+            </a:pPr>
+            <a:r>
+              <a:t/>
+            </a:r>
+            <a:endParaRPr/>
+          </a:p>
+          <a:p>
             <a:pPr lvl="0">
               <a:spcBef>
                 <a:spcPts val="0"/>
@@ -2001,7 +2043,7 @@
   <p:cSld>
     <p:spTree>
       <p:nvGrpSpPr>
-        <p:cNvPr id="241" name="Shape 241"/>
+        <p:cNvPr id="242" name="Shape 242"/>
         <p:cNvGrpSpPr/>
         <p:nvPr/>
       </p:nvGrpSpPr>
@@ -2015,7 +2057,7 @@
       </p:grpSpPr>
       <p:sp>
         <p:nvSpPr>
-          <p:cNvPr id="242" name="Shape 242"/>
+          <p:cNvPr id="243" name="Shape 243"/>
           <p:cNvSpPr/>
           <p:nvPr>
             <p:ph idx="2" type="sldImg"/>
@@ -2049,7 +2091,7 @@
       </p:sp>
       <p:sp>
         <p:nvSpPr>
-          <p:cNvPr id="243" name="Shape 243"/>
+          <p:cNvPr id="244" name="Shape 244"/>
           <p:cNvSpPr txBox="1"/>
           <p:nvPr>
             <p:ph idx="1" type="body"/>
@@ -2070,7 +2112,7 @@
           </a:bodyPr>
           <a:lstStyle/>
           <a:p>
-            <a:pPr lvl="0" rtl="0">
+            <a:pPr lvl="0">
               <a:spcBef>
                 <a:spcPts val="0"/>
               </a:spcBef>
@@ -2096,7 +2138,7 @@
   <p:cSld>
     <p:spTree>
       <p:nvGrpSpPr>
-        <p:cNvPr id="247" name="Shape 247"/>
+        <p:cNvPr id="248" name="Shape 248"/>
         <p:cNvGrpSpPr/>
         <p:nvPr/>
       </p:nvGrpSpPr>
@@ -2110,7 +2152,7 @@
       </p:grpSpPr>
       <p:sp>
         <p:nvSpPr>
-          <p:cNvPr id="248" name="Shape 248"/>
+          <p:cNvPr id="249" name="Shape 249"/>
           <p:cNvSpPr/>
           <p:nvPr>
             <p:ph idx="2" type="sldImg"/>
@@ -2144,7 +2186,102 @@
       </p:sp>
       <p:sp>
         <p:nvSpPr>
-          <p:cNvPr id="249" name="Shape 249"/>
+          <p:cNvPr id="250" name="Shape 250"/>
+          <p:cNvSpPr txBox="1"/>
+          <p:nvPr>
+            <p:ph idx="1" type="body"/>
+          </p:nvPr>
+        </p:nvSpPr>
+        <p:spPr>
+          <a:xfrm>
+            <a:off x="685800" y="4343400"/>
+            <a:ext cx="5486400" cy="4114800"/>
+          </a:xfrm>
+          <a:prstGeom prst="rect">
+            <a:avLst/>
+          </a:prstGeom>
+        </p:spPr>
+        <p:txBody>
+          <a:bodyPr anchorCtr="0" anchor="t" bIns="91425" lIns="91425" rIns="91425" tIns="91425">
+            <a:noAutofit/>
+          </a:bodyPr>
+          <a:lstStyle/>
+          <a:p>
+            <a:pPr lvl="0" rtl="0">
+              <a:spcBef>
+                <a:spcPts val="0"/>
+              </a:spcBef>
+              <a:buNone/>
+            </a:pPr>
+            <a:r>
+              <a:t/>
+            </a:r>
+            <a:endParaRPr/>
+          </a:p>
+        </p:txBody>
+      </p:sp>
+    </p:spTree>
+  </p:cSld>
+  <p:clrMapOvr>
+    <a:masterClrMapping/>
+  </p:clrMapOvr>
+</p:notes>
+</file>
+
+<file path=ppt/notesSlides/notesSlide25.xml><?xml version="1.0" encoding="utf-8"?>
+<p:notes xmlns:a="http://schemas.openxmlformats.org/drawingml/2006/main" xmlns:r="http://schemas.openxmlformats.org/officeDocument/2006/relationships" xmlns:mc="http://schemas.openxmlformats.org/markup-compatibility/2006" xmlns:mv="urn:schemas-microsoft-com:mac:vml" xmlns:p="http://schemas.openxmlformats.org/presentationml/2006/main" xmlns:c="http://schemas.openxmlformats.org/drawingml/2006/chart" xmlns:dgm="http://schemas.openxmlformats.org/drawingml/2006/diagram" xmlns:o="urn:schemas-microsoft-com:office:office" xmlns:v="urn:schemas-microsoft-com:vml" xmlns:pvml="urn:schemas-microsoft-com:office:powerpoint" xmlns:com="http://schemas.openxmlformats.org/drawingml/2006/compatibility" xmlns:p14="http://schemas.microsoft.com/office/powerpoint/2010/main" showMasterPhAnim="0" showMasterSp="0">
+  <p:cSld>
+    <p:spTree>
+      <p:nvGrpSpPr>
+        <p:cNvPr id="254" name="Shape 254"/>
+        <p:cNvGrpSpPr/>
+        <p:nvPr/>
+      </p:nvGrpSpPr>
+      <p:grpSpPr>
+        <a:xfrm>
+          <a:off x="0" y="0"/>
+          <a:ext cx="0" cy="0"/>
+          <a:chOff x="0" y="0"/>
+          <a:chExt cx="0" cy="0"/>
+        </a:xfrm>
+      </p:grpSpPr>
+      <p:sp>
+        <p:nvSpPr>
+          <p:cNvPr id="255" name="Shape 255"/>
+          <p:cNvSpPr/>
+          <p:nvPr>
+            <p:ph idx="2" type="sldImg"/>
+          </p:nvPr>
+        </p:nvSpPr>
+        <p:spPr>
+          <a:xfrm>
+            <a:off x="381300" y="685800"/>
+            <a:ext cx="6096000" cy="3429000"/>
+          </a:xfrm>
+          <a:custGeom>
+            <a:pathLst>
+              <a:path extrusionOk="0" h="120000" w="120000">
+                <a:moveTo>
+                  <a:pt x="0" y="0"/>
+                </a:moveTo>
+                <a:lnTo>
+                  <a:pt x="120000" y="0"/>
+                </a:lnTo>
+                <a:lnTo>
+                  <a:pt x="120000" y="120000"/>
+                </a:lnTo>
+                <a:lnTo>
+                  <a:pt x="0" y="120000"/>
+                </a:lnTo>
+                <a:close/>
+              </a:path>
+            </a:pathLst>
+          </a:custGeom>
+        </p:spPr>
+      </p:sp>
+      <p:sp>
+        <p:nvSpPr>
+          <p:cNvPr id="256" name="Shape 256"/>
           <p:cNvSpPr txBox="1"/>
           <p:nvPr>
             <p:ph idx="1" type="body"/>
@@ -7330,7 +7467,7 @@
             </a:r>
             <a:r>
               <a:rPr i="1" lang="en"/>
-              <a:t>Principle Components Analysis</a:t>
+              <a:t>Principal Components Analysis</a:t>
             </a:r>
             <a:r>
               <a:rPr lang="en"/>
@@ -7417,7 +7554,7 @@
             </a:pPr>
             <a:r>
               <a:rPr lang="en"/>
-              <a:t>Principle Components Analysis (PCA)</a:t>
+              <a:t>Principal Components Analysis (PCA)</a:t>
             </a:r>
           </a:p>
         </p:txBody>
@@ -7831,7 +7968,7 @@
             </a:pPr>
             <a:r>
               <a:rPr lang="en"/>
-              <a:t>Principle Components Analysis (PCA)</a:t>
+              <a:t>Principal Components Analysis (PCA)</a:t>
             </a:r>
             <a:br>
               <a:rPr lang="en"/>
@@ -7958,7 +8095,7 @@
             </a:pPr>
             <a:r>
               <a:rPr lang="en"/>
-              <a:t>The principle components are the eigenvectors of the covariance matrix.</a:t>
+              <a:t>The principal components are the eigenvectors of the covariance matrix.</a:t>
             </a:r>
             <a:br>
               <a:rPr lang="en"/>
@@ -8242,7 +8379,7 @@
             </a:pPr>
             <a:r>
               <a:rPr lang="en"/>
-              <a:t>Eigenfaces</a:t>
+              <a:t>Our dataset</a:t>
             </a:r>
           </a:p>
         </p:txBody>
@@ -8716,7 +8853,7 @@
             </a:pPr>
             <a:r>
               <a:rPr lang="en"/>
-              <a:t>Eigenfaces, let’s do PCA on these!</a:t>
+              <a:t>Let’s do PCA on this dataset of faces!</a:t>
             </a:r>
           </a:p>
         </p:txBody>
@@ -8822,7 +8959,23 @@
                   <a:srgbClr val="CC4125"/>
                 </a:solidFill>
               </a:rPr>
-              <a:t>This! We call these eigenfaces, because they are the eigenvectors of the face database covariance matrix.</a:t>
+              <a:t>This! We call these </a:t>
+            </a:r>
+            <a:r>
+              <a:rPr b="1" lang="en" sz="1800">
+                <a:solidFill>
+                  <a:srgbClr val="CC4125"/>
+                </a:solidFill>
+              </a:rPr>
+              <a:t>eigenfaces</a:t>
+            </a:r>
+            <a:r>
+              <a:rPr lang="en" sz="1800">
+                <a:solidFill>
+                  <a:srgbClr val="CC4125"/>
+                </a:solidFill>
+              </a:rPr>
+              <a:t>, because they are the eigenvectors of the face database covariance matrix.</a:t>
             </a:r>
           </a:p>
         </p:txBody>
@@ -9546,402 +9699,6 @@
   <p:transition spd="slow">
     <p:cut/>
   </p:transition>
-  <p:timing>
-    <p:tnLst>
-      <p:par>
-        <p:cTn dur="indefinite" nodeType="tmRoot" restart="never">
-          <p:childTnLst>
-            <p:seq concurrent="1" nextAc="seek">
-              <p:cTn dur="indefinite" id="2" nodeType="mainSeq">
-                <p:childTnLst>
-                  <p:par>
-                    <p:cTn fill="hold">
-                      <p:stCondLst>
-                        <p:cond delay="indefinite"/>
-                      </p:stCondLst>
-                      <p:childTnLst>
-                        <p:par>
-                          <p:cTn fill="hold">
-                            <p:stCondLst>
-                              <p:cond delay="0"/>
-                            </p:stCondLst>
-                            <p:childTnLst>
-                              <p:par>
-                                <p:cTn fill="hold" nodeType="clickEffect" presetClass="entr" presetID="10" presetSubtype="0">
-                                  <p:stCondLst>
-                                    <p:cond delay="0"/>
-                                  </p:stCondLst>
-                                  <p:childTnLst>
-                                    <p:set>
-                                      <p:cBhvr>
-                                        <p:cTn dur="1" fill="hold">
-                                          <p:stCondLst>
-                                            <p:cond delay="0"/>
-                                          </p:stCondLst>
-                                        </p:cTn>
-                                        <p:tgtEl>
-                                          <p:spTgt spid="175">
-                                            <p:txEl>
-                                              <p:pRg end="0" st="0"/>
-                                            </p:txEl>
-                                          </p:spTgt>
-                                        </p:tgtEl>
-                                        <p:attrNameLst>
-                                          <p:attrName>style.visibility</p:attrName>
-                                        </p:attrNameLst>
-                                      </p:cBhvr>
-                                      <p:to>
-                                        <p:strVal val="visible"/>
-                                      </p:to>
-                                    </p:set>
-                                    <p:animEffect filter="fade" transition="in">
-                                      <p:cBhvr>
-                                        <p:cTn dur="1000"/>
-                                        <p:tgtEl>
-                                          <p:spTgt spid="175">
-                                            <p:txEl>
-                                              <p:pRg end="0" st="0"/>
-                                            </p:txEl>
-                                          </p:spTgt>
-                                        </p:tgtEl>
-                                      </p:cBhvr>
-                                    </p:animEffect>
-                                  </p:childTnLst>
-                                </p:cTn>
-                              </p:par>
-                            </p:childTnLst>
-                          </p:cTn>
-                        </p:par>
-                      </p:childTnLst>
-                    </p:cTn>
-                  </p:par>
-                  <p:par>
-                    <p:cTn fill="hold">
-                      <p:stCondLst>
-                        <p:cond delay="indefinite"/>
-                      </p:stCondLst>
-                      <p:childTnLst>
-                        <p:par>
-                          <p:cTn fill="hold">
-                            <p:stCondLst>
-                              <p:cond delay="0"/>
-                            </p:stCondLst>
-                            <p:childTnLst>
-                              <p:par>
-                                <p:cTn fill="hold" nodeType="clickEffect" presetClass="entr" presetID="10" presetSubtype="0">
-                                  <p:stCondLst>
-                                    <p:cond delay="0"/>
-                                  </p:stCondLst>
-                                  <p:childTnLst>
-                                    <p:set>
-                                      <p:cBhvr>
-                                        <p:cTn dur="1" fill="hold">
-                                          <p:stCondLst>
-                                            <p:cond delay="0"/>
-                                          </p:stCondLst>
-                                        </p:cTn>
-                                        <p:tgtEl>
-                                          <p:spTgt spid="175">
-                                            <p:txEl>
-                                              <p:pRg end="1" st="1"/>
-                                            </p:txEl>
-                                          </p:spTgt>
-                                        </p:tgtEl>
-                                        <p:attrNameLst>
-                                          <p:attrName>style.visibility</p:attrName>
-                                        </p:attrNameLst>
-                                      </p:cBhvr>
-                                      <p:to>
-                                        <p:strVal val="visible"/>
-                                      </p:to>
-                                    </p:set>
-                                    <p:animEffect filter="fade" transition="in">
-                                      <p:cBhvr>
-                                        <p:cTn dur="1000"/>
-                                        <p:tgtEl>
-                                          <p:spTgt spid="175">
-                                            <p:txEl>
-                                              <p:pRg end="1" st="1"/>
-                                            </p:txEl>
-                                          </p:spTgt>
-                                        </p:tgtEl>
-                                      </p:cBhvr>
-                                    </p:animEffect>
-                                  </p:childTnLst>
-                                </p:cTn>
-                              </p:par>
-                            </p:childTnLst>
-                          </p:cTn>
-                        </p:par>
-                      </p:childTnLst>
-                    </p:cTn>
-                  </p:par>
-                  <p:par>
-                    <p:cTn fill="hold">
-                      <p:stCondLst>
-                        <p:cond delay="indefinite"/>
-                      </p:stCondLst>
-                      <p:childTnLst>
-                        <p:par>
-                          <p:cTn fill="hold">
-                            <p:stCondLst>
-                              <p:cond delay="0"/>
-                            </p:stCondLst>
-                            <p:childTnLst>
-                              <p:par>
-                                <p:cTn fill="hold" nodeType="clickEffect" presetClass="entr" presetID="10" presetSubtype="0">
-                                  <p:stCondLst>
-                                    <p:cond delay="0"/>
-                                  </p:stCondLst>
-                                  <p:childTnLst>
-                                    <p:set>
-                                      <p:cBhvr>
-                                        <p:cTn dur="1" fill="hold">
-                                          <p:stCondLst>
-                                            <p:cond delay="0"/>
-                                          </p:stCondLst>
-                                        </p:cTn>
-                                        <p:tgtEl>
-                                          <p:spTgt spid="175">
-                                            <p:txEl>
-                                              <p:pRg end="2" st="2"/>
-                                            </p:txEl>
-                                          </p:spTgt>
-                                        </p:tgtEl>
-                                        <p:attrNameLst>
-                                          <p:attrName>style.visibility</p:attrName>
-                                        </p:attrNameLst>
-                                      </p:cBhvr>
-                                      <p:to>
-                                        <p:strVal val="visible"/>
-                                      </p:to>
-                                    </p:set>
-                                    <p:animEffect filter="fade" transition="in">
-                                      <p:cBhvr>
-                                        <p:cTn dur="1000"/>
-                                        <p:tgtEl>
-                                          <p:spTgt spid="175">
-                                            <p:txEl>
-                                              <p:pRg end="2" st="2"/>
-                                            </p:txEl>
-                                          </p:spTgt>
-                                        </p:tgtEl>
-                                      </p:cBhvr>
-                                    </p:animEffect>
-                                  </p:childTnLst>
-                                </p:cTn>
-                              </p:par>
-                            </p:childTnLst>
-                          </p:cTn>
-                        </p:par>
-                      </p:childTnLst>
-                    </p:cTn>
-                  </p:par>
-                  <p:par>
-                    <p:cTn fill="hold">
-                      <p:stCondLst>
-                        <p:cond delay="indefinite"/>
-                      </p:stCondLst>
-                      <p:childTnLst>
-                        <p:par>
-                          <p:cTn fill="hold">
-                            <p:stCondLst>
-                              <p:cond delay="0"/>
-                            </p:stCondLst>
-                            <p:childTnLst>
-                              <p:par>
-                                <p:cTn fill="hold" nodeType="clickEffect" presetClass="entr" presetID="10" presetSubtype="0">
-                                  <p:stCondLst>
-                                    <p:cond delay="0"/>
-                                  </p:stCondLst>
-                                  <p:childTnLst>
-                                    <p:set>
-                                      <p:cBhvr>
-                                        <p:cTn dur="1" fill="hold">
-                                          <p:stCondLst>
-                                            <p:cond delay="0"/>
-                                          </p:stCondLst>
-                                        </p:cTn>
-                                        <p:tgtEl>
-                                          <p:spTgt spid="175">
-                                            <p:txEl>
-                                              <p:pRg end="3" st="3"/>
-                                            </p:txEl>
-                                          </p:spTgt>
-                                        </p:tgtEl>
-                                        <p:attrNameLst>
-                                          <p:attrName>style.visibility</p:attrName>
-                                        </p:attrNameLst>
-                                      </p:cBhvr>
-                                      <p:to>
-                                        <p:strVal val="visible"/>
-                                      </p:to>
-                                    </p:set>
-                                    <p:animEffect filter="fade" transition="in">
-                                      <p:cBhvr>
-                                        <p:cTn dur="1000"/>
-                                        <p:tgtEl>
-                                          <p:spTgt spid="175">
-                                            <p:txEl>
-                                              <p:pRg end="3" st="3"/>
-                                            </p:txEl>
-                                          </p:spTgt>
-                                        </p:tgtEl>
-                                      </p:cBhvr>
-                                    </p:animEffect>
-                                  </p:childTnLst>
-                                </p:cTn>
-                              </p:par>
-                            </p:childTnLst>
-                          </p:cTn>
-                        </p:par>
-                      </p:childTnLst>
-                    </p:cTn>
-                  </p:par>
-                  <p:par>
-                    <p:cTn fill="hold">
-                      <p:stCondLst>
-                        <p:cond delay="indefinite"/>
-                      </p:stCondLst>
-                      <p:childTnLst>
-                        <p:par>
-                          <p:cTn fill="hold">
-                            <p:stCondLst>
-                              <p:cond delay="0"/>
-                            </p:stCondLst>
-                            <p:childTnLst>
-                              <p:par>
-                                <p:cTn fill="hold" nodeType="clickEffect" presetClass="entr" presetID="10" presetSubtype="0">
-                                  <p:stCondLst>
-                                    <p:cond delay="0"/>
-                                  </p:stCondLst>
-                                  <p:childTnLst>
-                                    <p:set>
-                                      <p:cBhvr>
-                                        <p:cTn dur="1" fill="hold">
-                                          <p:stCondLst>
-                                            <p:cond delay="0"/>
-                                          </p:stCondLst>
-                                        </p:cTn>
-                                        <p:tgtEl>
-                                          <p:spTgt spid="175">
-                                            <p:txEl>
-                                              <p:pRg end="4" st="4"/>
-                                            </p:txEl>
-                                          </p:spTgt>
-                                        </p:tgtEl>
-                                        <p:attrNameLst>
-                                          <p:attrName>style.visibility</p:attrName>
-                                        </p:attrNameLst>
-                                      </p:cBhvr>
-                                      <p:to>
-                                        <p:strVal val="visible"/>
-                                      </p:to>
-                                    </p:set>
-                                    <p:animEffect filter="fade" transition="in">
-                                      <p:cBhvr>
-                                        <p:cTn dur="1000"/>
-                                        <p:tgtEl>
-                                          <p:spTgt spid="175">
-                                            <p:txEl>
-                                              <p:pRg end="4" st="4"/>
-                                            </p:txEl>
-                                          </p:spTgt>
-                                        </p:tgtEl>
-                                      </p:cBhvr>
-                                    </p:animEffect>
-                                  </p:childTnLst>
-                                </p:cTn>
-                              </p:par>
-                            </p:childTnLst>
-                          </p:cTn>
-                        </p:par>
-                      </p:childTnLst>
-                    </p:cTn>
-                  </p:par>
-                  <p:par>
-                    <p:cTn fill="hold">
-                      <p:stCondLst>
-                        <p:cond delay="indefinite"/>
-                      </p:stCondLst>
-                      <p:childTnLst>
-                        <p:par>
-                          <p:cTn fill="hold">
-                            <p:stCondLst>
-                              <p:cond delay="0"/>
-                            </p:stCondLst>
-                            <p:childTnLst>
-                              <p:par>
-                                <p:cTn fill="hold" nodeType="clickEffect" presetClass="entr" presetID="10" presetSubtype="0">
-                                  <p:stCondLst>
-                                    <p:cond delay="0"/>
-                                  </p:stCondLst>
-                                  <p:childTnLst>
-                                    <p:set>
-                                      <p:cBhvr>
-                                        <p:cTn dur="1" fill="hold">
-                                          <p:stCondLst>
-                                            <p:cond delay="0"/>
-                                          </p:stCondLst>
-                                        </p:cTn>
-                                        <p:tgtEl>
-                                          <p:spTgt spid="175">
-                                            <p:txEl>
-                                              <p:pRg end="5" st="5"/>
-                                            </p:txEl>
-                                          </p:spTgt>
-                                        </p:tgtEl>
-                                        <p:attrNameLst>
-                                          <p:attrName>style.visibility</p:attrName>
-                                        </p:attrNameLst>
-                                      </p:cBhvr>
-                                      <p:to>
-                                        <p:strVal val="visible"/>
-                                      </p:to>
-                                    </p:set>
-                                    <p:animEffect filter="fade" transition="in">
-                                      <p:cBhvr>
-                                        <p:cTn dur="1000"/>
-                                        <p:tgtEl>
-                                          <p:spTgt spid="175">
-                                            <p:txEl>
-                                              <p:pRg end="5" st="5"/>
-                                            </p:txEl>
-                                          </p:spTgt>
-                                        </p:tgtEl>
-                                      </p:cBhvr>
-                                    </p:animEffect>
-                                  </p:childTnLst>
-                                </p:cTn>
-                              </p:par>
-                            </p:childTnLst>
-                          </p:cTn>
-                        </p:par>
-                      </p:childTnLst>
-                    </p:cTn>
-                  </p:par>
-                </p:childTnLst>
-              </p:cTn>
-              <p:prevCondLst>
-                <p:cond evt="onPrev">
-                  <p:tgtEl>
-                    <p:sldTgt/>
-                  </p:tgtEl>
-                </p:cond>
-              </p:prevCondLst>
-              <p:nextCondLst>
-                <p:cond evt="onNext">
-                  <p:tgtEl>
-                    <p:sldTgt/>
-                  </p:tgtEl>
-                </p:cond>
-              </p:nextCondLst>
-            </p:seq>
-          </p:childTnLst>
-        </p:cTn>
-      </p:par>
-    </p:tnLst>
-  </p:timing>
 </p:sld>
 </file>
 
@@ -13306,8 +13063,8 @@
         </p:nvSpPr>
         <p:spPr>
           <a:xfrm>
-            <a:off x="471900" y="738725"/>
-            <a:ext cx="8222100" cy="767700"/>
+            <a:off x="471900" y="290675"/>
+            <a:ext cx="8222100" cy="1215600"/>
           </a:xfrm>
           <a:prstGeom prst="rect">
             <a:avLst/>
@@ -13319,6 +13076,18 @@
           </a:bodyPr>
           <a:lstStyle/>
           <a:p>
+            <a:pPr lvl="0" rtl="0">
+              <a:spcBef>
+                <a:spcPts val="0"/>
+              </a:spcBef>
+              <a:buNone/>
+            </a:pPr>
+            <a:r>
+              <a:rPr lang="en"/>
+              <a:t>When to use PCA</a:t>
+            </a:r>
+          </a:p>
+          <a:p>
             <a:pPr lvl="0">
               <a:spcBef>
                 <a:spcPts val="0"/>
@@ -13326,12 +13095,8 @@
               <a:buNone/>
             </a:pPr>
             <a:r>
-              <a:rPr i="1" lang="en"/>
-              <a:t>Singular Value Decomposition </a:t>
-            </a:r>
-            <a:r>
-              <a:rPr lang="en"/>
-              <a:t>(SVD)</a:t>
+              <a:rPr lang="en" sz="2400"/>
+              <a:t>(general advice only!)</a:t>
             </a:r>
           </a:p>
         </p:txBody>
@@ -13347,7 +13112,7 @@
         <p:spPr>
           <a:xfrm>
             <a:off x="471900" y="1919075"/>
-            <a:ext cx="8222100" cy="2710200"/>
+            <a:ext cx="4039800" cy="2710200"/>
           </a:xfrm>
           <a:prstGeom prst="rect">
             <a:avLst/>
@@ -13359,19 +13124,146 @@
           </a:bodyPr>
           <a:lstStyle/>
           <a:p>
-            <a:pPr lvl="0">
-              <a:spcBef>
-                <a:spcPts val="0"/>
-              </a:spcBef>
-              <a:buNone/>
-            </a:pPr>
-            <a:r>
-              <a:rPr b="1" lang="en">
-                <a:solidFill>
-                  <a:srgbClr val="CC4125"/>
-                </a:solidFill>
-              </a:rPr>
-              <a:t>Boardwork...</a:t>
+            <a:pPr lvl="0" rtl="0">
+              <a:spcBef>
+                <a:spcPts val="0"/>
+              </a:spcBef>
+              <a:buNone/>
+            </a:pPr>
+            <a:r>
+              <a:rPr b="1" lang="en"/>
+              <a:t>Use when:</a:t>
+            </a:r>
+          </a:p>
+          <a:p>
+            <a:pPr indent="-228600" lvl="0" marL="457200" rtl="0">
+              <a:spcBef>
+                <a:spcPts val="0"/>
+              </a:spcBef>
+            </a:pPr>
+            <a:r>
+              <a:rPr lang="en"/>
+              <a:t>kNN on high dimensional data</a:t>
+            </a:r>
+          </a:p>
+          <a:p>
+            <a:pPr indent="-228600" lvl="0" marL="457200" rtl="0">
+              <a:spcBef>
+                <a:spcPts val="0"/>
+              </a:spcBef>
+            </a:pPr>
+            <a:r>
+              <a:rPr lang="en"/>
+              <a:t>Clustering high dimensional data</a:t>
+            </a:r>
+          </a:p>
+          <a:p>
+            <a:pPr indent="-228600" lvl="0" marL="457200" rtl="0">
+              <a:spcBef>
+                <a:spcPts val="0"/>
+              </a:spcBef>
+            </a:pPr>
+            <a:r>
+              <a:rPr lang="en"/>
+              <a:t>Visualization </a:t>
+            </a:r>
+            <a:br>
+              <a:rPr lang="en"/>
+            </a:br>
+            <a:r>
+              <a:rPr lang="en" sz="1400"/>
+              <a:t>(e.g. embeddings)</a:t>
+            </a:r>
+          </a:p>
+          <a:p>
+            <a:pPr indent="-228600" lvl="0" marL="457200" rtl="0">
+              <a:spcBef>
+                <a:spcPts val="0"/>
+              </a:spcBef>
+            </a:pPr>
+            <a:r>
+              <a:rPr lang="en"/>
+              <a:t>Working with images </a:t>
+            </a:r>
+            <a:br>
+              <a:rPr lang="en"/>
+            </a:br>
+            <a:r>
+              <a:rPr lang="en" sz="1400"/>
+              <a:t>(e.g. would it work well to feed an image into a decision tree?)</a:t>
+            </a:r>
+          </a:p>
+        </p:txBody>
+      </p:sp>
+      <p:sp>
+        <p:nvSpPr>
+          <p:cNvPr id="241" name="Shape 241"/>
+          <p:cNvSpPr txBox="1"/>
+          <p:nvPr>
+            <p:ph idx="1" type="body"/>
+          </p:nvPr>
+        </p:nvSpPr>
+        <p:spPr>
+          <a:xfrm>
+            <a:off x="4933725" y="1919075"/>
+            <a:ext cx="4039800" cy="2710200"/>
+          </a:xfrm>
+          <a:prstGeom prst="rect">
+            <a:avLst/>
+          </a:prstGeom>
+        </p:spPr>
+        <p:txBody>
+          <a:bodyPr anchorCtr="0" anchor="t" bIns="91425" lIns="91425" rIns="91425" tIns="91425">
+            <a:noAutofit/>
+          </a:bodyPr>
+          <a:lstStyle/>
+          <a:p>
+            <a:pPr lvl="0" rtl="0">
+              <a:spcBef>
+                <a:spcPts val="0"/>
+              </a:spcBef>
+              <a:buNone/>
+            </a:pPr>
+            <a:r>
+              <a:rPr b="1" lang="en"/>
+              <a:t>Don’t use when:</a:t>
+            </a:r>
+          </a:p>
+          <a:p>
+            <a:pPr indent="-228600" lvl="0" marL="457200" rtl="0">
+              <a:spcBef>
+                <a:spcPts val="0"/>
+              </a:spcBef>
+            </a:pPr>
+            <a:r>
+              <a:rPr lang="en"/>
+              <a:t>You need to retain interpretability of your feature space</a:t>
+            </a:r>
+          </a:p>
+          <a:p>
+            <a:pPr indent="-228600" lvl="0" marL="457200" rtl="0">
+              <a:spcBef>
+                <a:spcPts val="0"/>
+              </a:spcBef>
+            </a:pPr>
+            <a:r>
+              <a:rPr lang="en"/>
+              <a:t>Your model doesn’t </a:t>
+            </a:r>
+            <a:r>
+              <a:rPr i="1" lang="en"/>
+              <a:t>need</a:t>
+            </a:r>
+            <a:r>
+              <a:rPr lang="en"/>
+              <a:t> reduced dimensional data</a:t>
+            </a:r>
+            <a:br>
+              <a:rPr lang="en"/>
+            </a:br>
+            <a:r>
+              <a:rPr lang="en" sz="1400"/>
+              <a:t>(e.g. OLS on relatively small data)</a:t>
             </a:r>
           </a:p>
         </p:txBody>
@@ -13392,7 +13284,7 @@
   <p:cSld>
     <p:spTree>
       <p:nvGrpSpPr>
-        <p:cNvPr id="244" name="Shape 244"/>
+        <p:cNvPr id="245" name="Shape 245"/>
         <p:cNvGrpSpPr/>
         <p:nvPr/>
       </p:nvGrpSpPr>
@@ -13406,7 +13298,7 @@
       </p:grpSpPr>
       <p:sp>
         <p:nvSpPr>
-          <p:cNvPr id="245" name="Shape 245"/>
+          <p:cNvPr id="246" name="Shape 246"/>
           <p:cNvSpPr txBox="1"/>
           <p:nvPr>
             <p:ph type="title"/>
@@ -13427,22 +13319,26 @@
           </a:bodyPr>
           <a:lstStyle/>
           <a:p>
-            <a:pPr lvl="0" rtl="0">
-              <a:spcBef>
-                <a:spcPts val="0"/>
-              </a:spcBef>
-              <a:buNone/>
-            </a:pPr>
+            <a:pPr lvl="0">
+              <a:spcBef>
+                <a:spcPts val="0"/>
+              </a:spcBef>
+              <a:buNone/>
+            </a:pPr>
+            <a:r>
+              <a:rPr i="1" lang="en"/>
+              <a:t>Singular Value Decomposition </a:t>
+            </a:r>
             <a:r>
               <a:rPr lang="en"/>
-              <a:t>SVD vs PCA</a:t>
+              <a:t>(SVD)</a:t>
             </a:r>
           </a:p>
         </p:txBody>
       </p:sp>
       <p:sp>
         <p:nvSpPr>
-          <p:cNvPr id="246" name="Shape 246"/>
+          <p:cNvPr id="247" name="Shape 247"/>
           <p:cNvSpPr txBox="1"/>
           <p:nvPr>
             <p:ph idx="1" type="body"/>
@@ -13463,7 +13359,7 @@
           </a:bodyPr>
           <a:lstStyle/>
           <a:p>
-            <a:pPr lvl="0" rtl="0">
+            <a:pPr lvl="0">
               <a:spcBef>
                 <a:spcPts val="0"/>
               </a:spcBef>
@@ -13496,7 +13392,7 @@
   <p:cSld>
     <p:spTree>
       <p:nvGrpSpPr>
-        <p:cNvPr id="250" name="Shape 250"/>
+        <p:cNvPr id="251" name="Shape 251"/>
         <p:cNvGrpSpPr/>
         <p:nvPr/>
       </p:nvGrpSpPr>
@@ -13510,7 +13406,7 @@
       </p:grpSpPr>
       <p:sp>
         <p:nvSpPr>
-          <p:cNvPr id="251" name="Shape 251"/>
+          <p:cNvPr id="252" name="Shape 252"/>
           <p:cNvSpPr txBox="1"/>
           <p:nvPr>
             <p:ph type="title"/>
@@ -13539,14 +13435,118 @@
             </a:pPr>
             <a:r>
               <a:rPr lang="en"/>
-              <a:t>SVD for capturing latent features</a:t>
+              <a:t>SVD vs PCA</a:t>
             </a:r>
           </a:p>
         </p:txBody>
       </p:sp>
       <p:sp>
         <p:nvSpPr>
-          <p:cNvPr id="252" name="Shape 252"/>
+          <p:cNvPr id="253" name="Shape 253"/>
+          <p:cNvSpPr txBox="1"/>
+          <p:nvPr>
+            <p:ph idx="1" type="body"/>
+          </p:nvPr>
+        </p:nvSpPr>
+        <p:spPr>
+          <a:xfrm>
+            <a:off x="471900" y="1919075"/>
+            <a:ext cx="8222100" cy="2710200"/>
+          </a:xfrm>
+          <a:prstGeom prst="rect">
+            <a:avLst/>
+          </a:prstGeom>
+        </p:spPr>
+        <p:txBody>
+          <a:bodyPr anchorCtr="0" anchor="t" bIns="91425" lIns="91425" rIns="91425" tIns="91425">
+            <a:noAutofit/>
+          </a:bodyPr>
+          <a:lstStyle/>
+          <a:p>
+            <a:pPr lvl="0" rtl="0">
+              <a:spcBef>
+                <a:spcPts val="0"/>
+              </a:spcBef>
+              <a:buNone/>
+            </a:pPr>
+            <a:r>
+              <a:rPr b="1" lang="en">
+                <a:solidFill>
+                  <a:srgbClr val="CC4125"/>
+                </a:solidFill>
+              </a:rPr>
+              <a:t>Boardwork...</a:t>
+            </a:r>
+          </a:p>
+        </p:txBody>
+      </p:sp>
+    </p:spTree>
+  </p:cSld>
+  <p:clrMapOvr>
+    <a:masterClrMapping/>
+  </p:clrMapOvr>
+  <p:transition spd="slow">
+    <p:cut/>
+  </p:transition>
+</p:sld>
+</file>
+
+<file path=ppt/slides/slide25.xml><?xml version="1.0" encoding="utf-8"?>
+<p:sld xmlns:a="http://schemas.openxmlformats.org/drawingml/2006/main" xmlns:r="http://schemas.openxmlformats.org/officeDocument/2006/relationships" xmlns:mc="http://schemas.openxmlformats.org/markup-compatibility/2006" xmlns:mv="urn:schemas-microsoft-com:mac:vml" xmlns:p="http://schemas.openxmlformats.org/presentationml/2006/main" xmlns:c="http://schemas.openxmlformats.org/drawingml/2006/chart" xmlns:dgm="http://schemas.openxmlformats.org/drawingml/2006/diagram" xmlns:o="urn:schemas-microsoft-com:office:office" xmlns:v="urn:schemas-microsoft-com:vml" xmlns:pvml="urn:schemas-microsoft-com:office:powerpoint" xmlns:com="http://schemas.openxmlformats.org/drawingml/2006/compatibility" xmlns:p14="http://schemas.microsoft.com/office/powerpoint/2010/main">
+  <p:cSld>
+    <p:spTree>
+      <p:nvGrpSpPr>
+        <p:cNvPr id="257" name="Shape 257"/>
+        <p:cNvGrpSpPr/>
+        <p:nvPr/>
+      </p:nvGrpSpPr>
+      <p:grpSpPr>
+        <a:xfrm>
+          <a:off x="0" y="0"/>
+          <a:ext cx="0" cy="0"/>
+          <a:chOff x="0" y="0"/>
+          <a:chExt cx="0" cy="0"/>
+        </a:xfrm>
+      </p:grpSpPr>
+      <p:sp>
+        <p:nvSpPr>
+          <p:cNvPr id="258" name="Shape 258"/>
+          <p:cNvSpPr txBox="1"/>
+          <p:nvPr>
+            <p:ph type="title"/>
+          </p:nvPr>
+        </p:nvSpPr>
+        <p:spPr>
+          <a:xfrm>
+            <a:off x="471900" y="738725"/>
+            <a:ext cx="8222100" cy="767700"/>
+          </a:xfrm>
+          <a:prstGeom prst="rect">
+            <a:avLst/>
+          </a:prstGeom>
+        </p:spPr>
+        <p:txBody>
+          <a:bodyPr anchorCtr="0" anchor="b" bIns="91425" lIns="91425" rIns="91425" tIns="91425">
+            <a:noAutofit/>
+          </a:bodyPr>
+          <a:lstStyle/>
+          <a:p>
+            <a:pPr lvl="0" rtl="0">
+              <a:spcBef>
+                <a:spcPts val="0"/>
+              </a:spcBef>
+              <a:buNone/>
+            </a:pPr>
+            <a:r>
+              <a:rPr lang="en"/>
+              <a:t>SVD for capturing latent features</a:t>
+            </a:r>
+          </a:p>
+        </p:txBody>
+      </p:sp>
+      <p:sp>
+        <p:nvSpPr>
+          <p:cNvPr id="259" name="Shape 259"/>
           <p:cNvSpPr txBox="1"/>
           <p:nvPr>
             <p:ph idx="1" type="body"/>
@@ -14719,7 +14719,7 @@
             </a:pPr>
             <a:r>
               <a:rPr lang="en"/>
-              <a:t>Principle Components Analysis (PCA)</a:t>
+              <a:t>Principal Components Analysis (PCA)</a:t>
             </a:r>
           </a:p>
         </p:txBody>
@@ -14810,555 +14810,6 @@
             <p:seq concurrent="1" nextAc="seek">
               <p:cTn dur="indefinite" id="2" nodeType="mainSeq">
                 <p:childTnLst>
-                  <p:par>
-                    <p:cTn fill="hold">
-                      <p:stCondLst>
-                        <p:cond delay="indefinite"/>
-                      </p:stCondLst>
-                      <p:childTnLst>
-                        <p:par>
-                          <p:cTn fill="hold">
-                            <p:stCondLst>
-                              <p:cond delay="0"/>
-                            </p:stCondLst>
-                            <p:childTnLst>
-                              <p:par>
-                                <p:cTn fill="hold" nodeType="clickEffect" presetClass="entr" presetID="10" presetSubtype="0">
-                                  <p:stCondLst>
-                                    <p:cond delay="0"/>
-                                  </p:stCondLst>
-                                  <p:childTnLst>
-                                    <p:set>
-                                      <p:cBhvr>
-                                        <p:cTn dur="1" fill="hold">
-                                          <p:stCondLst>
-                                            <p:cond delay="0"/>
-                                          </p:stCondLst>
-                                        </p:cTn>
-                                        <p:tgtEl>
-                                          <p:spTgt spid="93">
-                                            <p:txEl>
-                                              <p:pRg end="0" st="0"/>
-                                            </p:txEl>
-                                          </p:spTgt>
-                                        </p:tgtEl>
-                                        <p:attrNameLst>
-                                          <p:attrName>style.visibility</p:attrName>
-                                        </p:attrNameLst>
-                                      </p:cBhvr>
-                                      <p:to>
-                                        <p:strVal val="visible"/>
-                                      </p:to>
-                                    </p:set>
-                                    <p:animEffect filter="fade" transition="in">
-                                      <p:cBhvr>
-                                        <p:cTn dur="1000"/>
-                                        <p:tgtEl>
-                                          <p:spTgt spid="93">
-                                            <p:txEl>
-                                              <p:pRg end="0" st="0"/>
-                                            </p:txEl>
-                                          </p:spTgt>
-                                        </p:tgtEl>
-                                      </p:cBhvr>
-                                    </p:animEffect>
-                                  </p:childTnLst>
-                                </p:cTn>
-                              </p:par>
-                            </p:childTnLst>
-                          </p:cTn>
-                        </p:par>
-                      </p:childTnLst>
-                    </p:cTn>
-                  </p:par>
-                  <p:par>
-                    <p:cTn fill="hold">
-                      <p:stCondLst>
-                        <p:cond delay="indefinite"/>
-                      </p:stCondLst>
-                      <p:childTnLst>
-                        <p:par>
-                          <p:cTn fill="hold">
-                            <p:stCondLst>
-                              <p:cond delay="0"/>
-                            </p:stCondLst>
-                            <p:childTnLst>
-                              <p:par>
-                                <p:cTn fill="hold" nodeType="clickEffect" presetClass="entr" presetID="10" presetSubtype="0">
-                                  <p:stCondLst>
-                                    <p:cond delay="0"/>
-                                  </p:stCondLst>
-                                  <p:childTnLst>
-                                    <p:set>
-                                      <p:cBhvr>
-                                        <p:cTn dur="1" fill="hold">
-                                          <p:stCondLst>
-                                            <p:cond delay="0"/>
-                                          </p:stCondLst>
-                                        </p:cTn>
-                                        <p:tgtEl>
-                                          <p:spTgt spid="93">
-                                            <p:txEl>
-                                              <p:pRg end="1" st="1"/>
-                                            </p:txEl>
-                                          </p:spTgt>
-                                        </p:tgtEl>
-                                        <p:attrNameLst>
-                                          <p:attrName>style.visibility</p:attrName>
-                                        </p:attrNameLst>
-                                      </p:cBhvr>
-                                      <p:to>
-                                        <p:strVal val="visible"/>
-                                      </p:to>
-                                    </p:set>
-                                    <p:animEffect filter="fade" transition="in">
-                                      <p:cBhvr>
-                                        <p:cTn dur="1000"/>
-                                        <p:tgtEl>
-                                          <p:spTgt spid="93">
-                                            <p:txEl>
-                                              <p:pRg end="1" st="1"/>
-                                            </p:txEl>
-                                          </p:spTgt>
-                                        </p:tgtEl>
-                                      </p:cBhvr>
-                                    </p:animEffect>
-                                  </p:childTnLst>
-                                </p:cTn>
-                              </p:par>
-                            </p:childTnLst>
-                          </p:cTn>
-                        </p:par>
-                      </p:childTnLst>
-                    </p:cTn>
-                  </p:par>
-                  <p:par>
-                    <p:cTn fill="hold">
-                      <p:stCondLst>
-                        <p:cond delay="indefinite"/>
-                      </p:stCondLst>
-                      <p:childTnLst>
-                        <p:par>
-                          <p:cTn fill="hold">
-                            <p:stCondLst>
-                              <p:cond delay="0"/>
-                            </p:stCondLst>
-                            <p:childTnLst>
-                              <p:par>
-                                <p:cTn fill="hold" nodeType="clickEffect" presetClass="entr" presetID="10" presetSubtype="0">
-                                  <p:stCondLst>
-                                    <p:cond delay="0"/>
-                                  </p:stCondLst>
-                                  <p:childTnLst>
-                                    <p:set>
-                                      <p:cBhvr>
-                                        <p:cTn dur="1" fill="hold">
-                                          <p:stCondLst>
-                                            <p:cond delay="0"/>
-                                          </p:stCondLst>
-                                        </p:cTn>
-                                        <p:tgtEl>
-                                          <p:spTgt spid="93">
-                                            <p:txEl>
-                                              <p:pRg end="2" st="2"/>
-                                            </p:txEl>
-                                          </p:spTgt>
-                                        </p:tgtEl>
-                                        <p:attrNameLst>
-                                          <p:attrName>style.visibility</p:attrName>
-                                        </p:attrNameLst>
-                                      </p:cBhvr>
-                                      <p:to>
-                                        <p:strVal val="visible"/>
-                                      </p:to>
-                                    </p:set>
-                                    <p:animEffect filter="fade" transition="in">
-                                      <p:cBhvr>
-                                        <p:cTn dur="1000"/>
-                                        <p:tgtEl>
-                                          <p:spTgt spid="93">
-                                            <p:txEl>
-                                              <p:pRg end="2" st="2"/>
-                                            </p:txEl>
-                                          </p:spTgt>
-                                        </p:tgtEl>
-                                      </p:cBhvr>
-                                    </p:animEffect>
-                                  </p:childTnLst>
-                                </p:cTn>
-                              </p:par>
-                            </p:childTnLst>
-                          </p:cTn>
-                        </p:par>
-                      </p:childTnLst>
-                    </p:cTn>
-                  </p:par>
-                  <p:par>
-                    <p:cTn fill="hold">
-                      <p:stCondLst>
-                        <p:cond delay="indefinite"/>
-                      </p:stCondLst>
-                      <p:childTnLst>
-                        <p:par>
-                          <p:cTn fill="hold">
-                            <p:stCondLst>
-                              <p:cond delay="0"/>
-                            </p:stCondLst>
-                            <p:childTnLst>
-                              <p:par>
-                                <p:cTn fill="hold" nodeType="clickEffect" presetClass="entr" presetID="10" presetSubtype="0">
-                                  <p:stCondLst>
-                                    <p:cond delay="0"/>
-                                  </p:stCondLst>
-                                  <p:childTnLst>
-                                    <p:set>
-                                      <p:cBhvr>
-                                        <p:cTn dur="1" fill="hold">
-                                          <p:stCondLst>
-                                            <p:cond delay="0"/>
-                                          </p:stCondLst>
-                                        </p:cTn>
-                                        <p:tgtEl>
-                                          <p:spTgt spid="93">
-                                            <p:txEl>
-                                              <p:pRg end="3" st="3"/>
-                                            </p:txEl>
-                                          </p:spTgt>
-                                        </p:tgtEl>
-                                        <p:attrNameLst>
-                                          <p:attrName>style.visibility</p:attrName>
-                                        </p:attrNameLst>
-                                      </p:cBhvr>
-                                      <p:to>
-                                        <p:strVal val="visible"/>
-                                      </p:to>
-                                    </p:set>
-                                    <p:animEffect filter="fade" transition="in">
-                                      <p:cBhvr>
-                                        <p:cTn dur="1000"/>
-                                        <p:tgtEl>
-                                          <p:spTgt spid="93">
-                                            <p:txEl>
-                                              <p:pRg end="3" st="3"/>
-                                            </p:txEl>
-                                          </p:spTgt>
-                                        </p:tgtEl>
-                                      </p:cBhvr>
-                                    </p:animEffect>
-                                  </p:childTnLst>
-                                </p:cTn>
-                              </p:par>
-                            </p:childTnLst>
-                          </p:cTn>
-                        </p:par>
-                      </p:childTnLst>
-                    </p:cTn>
-                  </p:par>
-                  <p:par>
-                    <p:cTn fill="hold">
-                      <p:stCondLst>
-                        <p:cond delay="indefinite"/>
-                      </p:stCondLst>
-                      <p:childTnLst>
-                        <p:par>
-                          <p:cTn fill="hold">
-                            <p:stCondLst>
-                              <p:cond delay="0"/>
-                            </p:stCondLst>
-                            <p:childTnLst>
-                              <p:par>
-                                <p:cTn fill="hold" nodeType="clickEffect" presetClass="entr" presetID="10" presetSubtype="0">
-                                  <p:stCondLst>
-                                    <p:cond delay="0"/>
-                                  </p:stCondLst>
-                                  <p:childTnLst>
-                                    <p:set>
-                                      <p:cBhvr>
-                                        <p:cTn dur="1" fill="hold">
-                                          <p:stCondLst>
-                                            <p:cond delay="0"/>
-                                          </p:stCondLst>
-                                        </p:cTn>
-                                        <p:tgtEl>
-                                          <p:spTgt spid="93">
-                                            <p:txEl>
-                                              <p:pRg end="4" st="4"/>
-                                            </p:txEl>
-                                          </p:spTgt>
-                                        </p:tgtEl>
-                                        <p:attrNameLst>
-                                          <p:attrName>style.visibility</p:attrName>
-                                        </p:attrNameLst>
-                                      </p:cBhvr>
-                                      <p:to>
-                                        <p:strVal val="visible"/>
-                                      </p:to>
-                                    </p:set>
-                                    <p:animEffect filter="fade" transition="in">
-                                      <p:cBhvr>
-                                        <p:cTn dur="1000"/>
-                                        <p:tgtEl>
-                                          <p:spTgt spid="93">
-                                            <p:txEl>
-                                              <p:pRg end="4" st="4"/>
-                                            </p:txEl>
-                                          </p:spTgt>
-                                        </p:tgtEl>
-                                      </p:cBhvr>
-                                    </p:animEffect>
-                                  </p:childTnLst>
-                                </p:cTn>
-                              </p:par>
-                            </p:childTnLst>
-                          </p:cTn>
-                        </p:par>
-                      </p:childTnLst>
-                    </p:cTn>
-                  </p:par>
-                  <p:par>
-                    <p:cTn fill="hold">
-                      <p:stCondLst>
-                        <p:cond delay="indefinite"/>
-                      </p:stCondLst>
-                      <p:childTnLst>
-                        <p:par>
-                          <p:cTn fill="hold">
-                            <p:stCondLst>
-                              <p:cond delay="0"/>
-                            </p:stCondLst>
-                            <p:childTnLst>
-                              <p:par>
-                                <p:cTn fill="hold" nodeType="clickEffect" presetClass="entr" presetID="10" presetSubtype="0">
-                                  <p:stCondLst>
-                                    <p:cond delay="0"/>
-                                  </p:stCondLst>
-                                  <p:childTnLst>
-                                    <p:set>
-                                      <p:cBhvr>
-                                        <p:cTn dur="1" fill="hold">
-                                          <p:stCondLst>
-                                            <p:cond delay="0"/>
-                                          </p:stCondLst>
-                                        </p:cTn>
-                                        <p:tgtEl>
-                                          <p:spTgt spid="93">
-                                            <p:txEl>
-                                              <p:pRg end="5" st="5"/>
-                                            </p:txEl>
-                                          </p:spTgt>
-                                        </p:tgtEl>
-                                        <p:attrNameLst>
-                                          <p:attrName>style.visibility</p:attrName>
-                                        </p:attrNameLst>
-                                      </p:cBhvr>
-                                      <p:to>
-                                        <p:strVal val="visible"/>
-                                      </p:to>
-                                    </p:set>
-                                    <p:animEffect filter="fade" transition="in">
-                                      <p:cBhvr>
-                                        <p:cTn dur="1000"/>
-                                        <p:tgtEl>
-                                          <p:spTgt spid="93">
-                                            <p:txEl>
-                                              <p:pRg end="5" st="5"/>
-                                            </p:txEl>
-                                          </p:spTgt>
-                                        </p:tgtEl>
-                                      </p:cBhvr>
-                                    </p:animEffect>
-                                  </p:childTnLst>
-                                </p:cTn>
-                              </p:par>
-                            </p:childTnLst>
-                          </p:cTn>
-                        </p:par>
-                      </p:childTnLst>
-                    </p:cTn>
-                  </p:par>
-                  <p:par>
-                    <p:cTn fill="hold">
-                      <p:stCondLst>
-                        <p:cond delay="indefinite"/>
-                      </p:stCondLst>
-                      <p:childTnLst>
-                        <p:par>
-                          <p:cTn fill="hold">
-                            <p:stCondLst>
-                              <p:cond delay="0"/>
-                            </p:stCondLst>
-                            <p:childTnLst>
-                              <p:par>
-                                <p:cTn fill="hold" nodeType="clickEffect" presetClass="entr" presetID="10" presetSubtype="0">
-                                  <p:stCondLst>
-                                    <p:cond delay="0"/>
-                                  </p:stCondLst>
-                                  <p:childTnLst>
-                                    <p:set>
-                                      <p:cBhvr>
-                                        <p:cTn dur="1" fill="hold">
-                                          <p:stCondLst>
-                                            <p:cond delay="0"/>
-                                          </p:stCondLst>
-                                        </p:cTn>
-                                        <p:tgtEl>
-                                          <p:spTgt spid="93">
-                                            <p:txEl>
-                                              <p:pRg end="6" st="6"/>
-                                            </p:txEl>
-                                          </p:spTgt>
-                                        </p:tgtEl>
-                                        <p:attrNameLst>
-                                          <p:attrName>style.visibility</p:attrName>
-                                        </p:attrNameLst>
-                                      </p:cBhvr>
-                                      <p:to>
-                                        <p:strVal val="visible"/>
-                                      </p:to>
-                                    </p:set>
-                                    <p:animEffect filter="fade" transition="in">
-                                      <p:cBhvr>
-                                        <p:cTn dur="1000"/>
-                                        <p:tgtEl>
-                                          <p:spTgt spid="93">
-                                            <p:txEl>
-                                              <p:pRg end="6" st="6"/>
-                                            </p:txEl>
-                                          </p:spTgt>
-                                        </p:tgtEl>
-                                      </p:cBhvr>
-                                    </p:animEffect>
-                                  </p:childTnLst>
-                                </p:cTn>
-                              </p:par>
-                            </p:childTnLst>
-                          </p:cTn>
-                        </p:par>
-                      </p:childTnLst>
-                    </p:cTn>
-                  </p:par>
-                  <p:par>
-                    <p:cTn fill="hold">
-                      <p:stCondLst>
-                        <p:cond delay="indefinite"/>
-                      </p:stCondLst>
-                      <p:childTnLst>
-                        <p:par>
-                          <p:cTn fill="hold">
-                            <p:stCondLst>
-                              <p:cond delay="0"/>
-                            </p:stCondLst>
-                            <p:childTnLst>
-                              <p:par>
-                                <p:cTn fill="hold" nodeType="clickEffect" presetClass="entr" presetID="10" presetSubtype="0">
-                                  <p:stCondLst>
-                                    <p:cond delay="0"/>
-                                  </p:stCondLst>
-                                  <p:childTnLst>
-                                    <p:set>
-                                      <p:cBhvr>
-                                        <p:cTn dur="1" fill="hold">
-                                          <p:stCondLst>
-                                            <p:cond delay="0"/>
-                                          </p:stCondLst>
-                                        </p:cTn>
-                                        <p:tgtEl>
-                                          <p:spTgt spid="93">
-                                            <p:txEl>
-                                              <p:pRg end="7" st="7"/>
-                                            </p:txEl>
-                                          </p:spTgt>
-                                        </p:tgtEl>
-                                        <p:attrNameLst>
-                                          <p:attrName>style.visibility</p:attrName>
-                                        </p:attrNameLst>
-                                      </p:cBhvr>
-                                      <p:to>
-                                        <p:strVal val="visible"/>
-                                      </p:to>
-                                    </p:set>
-                                    <p:animEffect filter="fade" transition="in">
-                                      <p:cBhvr>
-                                        <p:cTn dur="1000"/>
-                                        <p:tgtEl>
-                                          <p:spTgt spid="93">
-                                            <p:txEl>
-                                              <p:pRg end="7" st="7"/>
-                                            </p:txEl>
-                                          </p:spTgt>
-                                        </p:tgtEl>
-                                      </p:cBhvr>
-                                    </p:animEffect>
-                                  </p:childTnLst>
-                                </p:cTn>
-                              </p:par>
-                            </p:childTnLst>
-                          </p:cTn>
-                        </p:par>
-                      </p:childTnLst>
-                    </p:cTn>
-                  </p:par>
-                  <p:par>
-                    <p:cTn fill="hold">
-                      <p:stCondLst>
-                        <p:cond delay="indefinite"/>
-                      </p:stCondLst>
-                      <p:childTnLst>
-                        <p:par>
-                          <p:cTn fill="hold">
-                            <p:stCondLst>
-                              <p:cond delay="0"/>
-                            </p:stCondLst>
-                            <p:childTnLst>
-                              <p:par>
-                                <p:cTn fill="hold" nodeType="clickEffect" presetClass="entr" presetID="10" presetSubtype="0">
-                                  <p:stCondLst>
-                                    <p:cond delay="0"/>
-                                  </p:stCondLst>
-                                  <p:childTnLst>
-                                    <p:set>
-                                      <p:cBhvr>
-                                        <p:cTn dur="1" fill="hold">
-                                          <p:stCondLst>
-                                            <p:cond delay="0"/>
-                                          </p:stCondLst>
-                                        </p:cTn>
-                                        <p:tgtEl>
-                                          <p:spTgt spid="93">
-                                            <p:txEl>
-                                              <p:pRg end="8" st="8"/>
-                                            </p:txEl>
-                                          </p:spTgt>
-                                        </p:tgtEl>
-                                        <p:attrNameLst>
-                                          <p:attrName>style.visibility</p:attrName>
-                                        </p:attrNameLst>
-                                      </p:cBhvr>
-                                      <p:to>
-                                        <p:strVal val="visible"/>
-                                      </p:to>
-                                    </p:set>
-                                    <p:animEffect filter="fade" transition="in">
-                                      <p:cBhvr>
-                                        <p:cTn dur="1000"/>
-                                        <p:tgtEl>
-                                          <p:spTgt spid="93">
-                                            <p:txEl>
-                                              <p:pRg end="8" st="8"/>
-                                            </p:txEl>
-                                          </p:spTgt>
-                                        </p:tgtEl>
-                                      </p:cBhvr>
-                                    </p:animEffect>
-                                  </p:childTnLst>
-                                </p:cTn>
-                              </p:par>
-                            </p:childTnLst>
-                          </p:cTn>
-                        </p:par>
-                      </p:childTnLst>
-                    </p:cTn>
-                  </p:par>
                   <p:par>
                     <p:cTn fill="hold">
                       <p:stCondLst>
@@ -17907,6 +17358,285 @@
 </file>
 
 <file path=ppt/theme/theme1.xml><?xml version="1.0" encoding="utf-8"?>
+<a:theme xmlns:a="http://schemas.openxmlformats.org/drawingml/2006/main" xmlns:r="http://schemas.openxmlformats.org/officeDocument/2006/relationships" name="Custom Theme">
+  <a:themeElements>
+    <a:clrScheme name="Default">
+      <a:dk1>
+        <a:srgbClr val="000000"/>
+      </a:dk1>
+      <a:lt1>
+        <a:srgbClr val="FFFFFF"/>
+      </a:lt1>
+      <a:dk2>
+        <a:srgbClr val="158158"/>
+      </a:dk2>
+      <a:lt2>
+        <a:srgbClr val="F3F3F3"/>
+      </a:lt2>
+      <a:accent1>
+        <a:srgbClr val="058DC7"/>
+      </a:accent1>
+      <a:accent2>
+        <a:srgbClr val="50B432"/>
+      </a:accent2>
+      <a:accent3>
+        <a:srgbClr val="ED561B"/>
+      </a:accent3>
+      <a:accent4>
+        <a:srgbClr val="EDEF00"/>
+      </a:accent4>
+      <a:accent5>
+        <a:srgbClr val="24CBE5"/>
+      </a:accent5>
+      <a:accent6>
+        <a:srgbClr val="64E572"/>
+      </a:accent6>
+      <a:hlink>
+        <a:srgbClr val="2200CC"/>
+      </a:hlink>
+      <a:folHlink>
+        <a:srgbClr val="551A8B"/>
+      </a:folHlink>
+    </a:clrScheme>
+    <a:fontScheme name="Office">
+      <a:majorFont>
+        <a:latin typeface="Arial"/>
+        <a:ea typeface=""/>
+        <a:cs typeface=""/>
+        <a:font script="Jpan" typeface="ＭＳ Ｐゴシック"/>
+        <a:font script="Hang" typeface="맑은 고딕"/>
+        <a:font script="Hans" typeface="宋体"/>
+        <a:font script="Hant" typeface="新細明體"/>
+        <a:font script="Arab" typeface="Times New Roman"/>
+        <a:font script="Hebr" typeface="Times New Roman"/>
+        <a:font script="Thai" typeface="Angsana New"/>
+        <a:font script="Ethi" typeface="Nyala"/>
+        <a:font script="Beng" typeface="Vrinda"/>
+        <a:font script="Gujr" typeface="Shruti"/>
+        <a:font script="Khmr" typeface="MoolBoran"/>
+        <a:font script="Knda" typeface="Tunga"/>
+        <a:font script="Guru" typeface="Raavi"/>
+        <a:font script="Cans" typeface="Euphemia"/>
+        <a:font script="Cher" typeface="Plantagenet Cherokee"/>
+        <a:font script="Yiii" typeface="Microsoft Yi Baiti"/>
+        <a:font script="Tibt" typeface="Microsoft Himalaya"/>
+        <a:font script="Thaa" typeface="MV Boli"/>
+        <a:font script="Deva" typeface="Mangal"/>
+        <a:font script="Telu" typeface="Gautami"/>
+        <a:font script="Taml" typeface="Latha"/>
+        <a:font script="Syrc" typeface="Estrangelo Edessa"/>
+        <a:font script="Orya" typeface="Kalinga"/>
+        <a:font script="Mlym" typeface="Kartika"/>
+        <a:font script="Laoo" typeface="DokChampa"/>
+        <a:font script="Sinh" typeface="Iskoola Pota"/>
+        <a:font script="Mong" typeface="Mongolian Baiti"/>
+        <a:font script="Viet" typeface="Times New Roman"/>
+        <a:font script="Uigh" typeface="Microsoft Uighur"/>
+        <a:font script="Geor" typeface="Sylfaen"/>
+      </a:majorFont>
+      <a:minorFont>
+        <a:latin typeface="Arial"/>
+        <a:ea typeface=""/>
+        <a:cs typeface=""/>
+        <a:font script="Jpan" typeface="ＭＳ Ｐゴシック"/>
+        <a:font script="Hang" typeface="맑은 고딕"/>
+        <a:font script="Hans" typeface="宋体"/>
+        <a:font script="Hant" typeface="新細明體"/>
+        <a:font script="Arab" typeface="Arial"/>
+        <a:font script="Hebr" typeface="Arial"/>
+        <a:font script="Thai" typeface="Cordia New"/>
+        <a:font script="Ethi" typeface="Nyala"/>
+        <a:font script="Beng" typeface="Vrinda"/>
+        <a:font script="Gujr" typeface="Shruti"/>
+        <a:font script="Khmr" typeface="DaunPenh"/>
+        <a:font script="Knda" typeface="Tunga"/>
+        <a:font script="Guru" typeface="Raavi"/>
+        <a:font script="Cans" typeface="Euphemia"/>
+        <a:font script="Cher" typeface="Plantagenet Cherokee"/>
+        <a:font script="Yiii" typeface="Microsoft Yi Baiti"/>
+        <a:font script="Tibt" typeface="Microsoft Himalaya"/>
+        <a:font script="Thaa" typeface="MV Boli"/>
+        <a:font script="Deva" typeface="Mangal"/>
+        <a:font script="Telu" typeface="Gautami"/>
+        <a:font script="Taml" typeface="Latha"/>
+        <a:font script="Syrc" typeface="Estrangelo Edessa"/>
+        <a:font script="Orya" typeface="Kalinga"/>
+        <a:font script="Mlym" typeface="Kartika"/>
+        <a:font script="Laoo" typeface="DokChampa"/>
+        <a:font script="Sinh" typeface="Iskoola Pota"/>
+        <a:font script="Mong" typeface="Mongolian Baiti"/>
+        <a:font script="Viet" typeface="Arial"/>
+        <a:font script="Uigh" typeface="Microsoft Uighur"/>
+        <a:font script="Geor" typeface="Sylfaen"/>
+      </a:minorFont>
+    </a:fontScheme>
+    <a:fmtScheme name="Office">
+      <a:fillStyleLst>
+        <a:solidFill>
+          <a:schemeClr val="phClr"/>
+        </a:solidFill>
+        <a:gradFill rotWithShape="1">
+          <a:gsLst>
+            <a:gs pos="0">
+              <a:schemeClr val="phClr">
+                <a:tint val="50000"/>
+                <a:satMod val="300000"/>
+              </a:schemeClr>
+            </a:gs>
+            <a:gs pos="35000">
+              <a:schemeClr val="phClr">
+                <a:tint val="37000"/>
+                <a:satMod val="300000"/>
+              </a:schemeClr>
+            </a:gs>
+            <a:gs pos="100000">
+              <a:schemeClr val="phClr">
+                <a:tint val="15000"/>
+                <a:satMod val="350000"/>
+              </a:schemeClr>
+            </a:gs>
+          </a:gsLst>
+          <a:lin ang="16200000" scaled="1"/>
+        </a:gradFill>
+        <a:gradFill rotWithShape="1">
+          <a:gsLst>
+            <a:gs pos="0">
+              <a:schemeClr val="phClr">
+                <a:tint val="100000"/>
+                <a:shade val="100000"/>
+                <a:satMod val="130000"/>
+              </a:schemeClr>
+            </a:gs>
+            <a:gs pos="100000">
+              <a:schemeClr val="phClr">
+                <a:tint val="50000"/>
+                <a:shade val="100000"/>
+                <a:satMod val="350000"/>
+              </a:schemeClr>
+            </a:gs>
+          </a:gsLst>
+          <a:lin ang="16200000" scaled="0"/>
+        </a:gradFill>
+      </a:fillStyleLst>
+      <a:lnStyleLst>
+        <a:ln w="9525" cap="flat" cmpd="sng" algn="ctr">
+          <a:solidFill>
+            <a:schemeClr val="phClr">
+              <a:shade val="95000"/>
+              <a:satMod val="105000"/>
+            </a:schemeClr>
+          </a:solidFill>
+          <a:prstDash val="solid"/>
+        </a:ln>
+        <a:ln w="25400" cap="flat" cmpd="sng" algn="ctr">
+          <a:solidFill>
+            <a:schemeClr val="phClr"/>
+          </a:solidFill>
+          <a:prstDash val="solid"/>
+        </a:ln>
+        <a:ln w="38100" cap="flat" cmpd="sng" algn="ctr">
+          <a:solidFill>
+            <a:schemeClr val="phClr"/>
+          </a:solidFill>
+          <a:prstDash val="solid"/>
+        </a:ln>
+      </a:lnStyleLst>
+      <a:effectStyleLst>
+        <a:effectStyle>
+          <a:effectLst>
+            <a:outerShdw blurRad="40000" dist="20000" dir="5400000" rotWithShape="0">
+              <a:srgbClr val="000000">
+                <a:alpha val="38000"/>
+              </a:srgbClr>
+            </a:outerShdw>
+          </a:effectLst>
+        </a:effectStyle>
+        <a:effectStyle>
+          <a:effectLst>
+            <a:outerShdw blurRad="40000" dist="23000" dir="5400000" rotWithShape="0">
+              <a:srgbClr val="000000">
+                <a:alpha val="35000"/>
+              </a:srgbClr>
+            </a:outerShdw>
+          </a:effectLst>
+        </a:effectStyle>
+        <a:effectStyle>
+          <a:effectLst>
+            <a:outerShdw blurRad="40000" dist="23000" dir="5400000" rotWithShape="0">
+              <a:srgbClr val="000000">
+                <a:alpha val="35000"/>
+              </a:srgbClr>
+            </a:outerShdw>
+          </a:effectLst>
+          <a:scene3d>
+            <a:camera prst="orthographicFront">
+              <a:rot lat="0" lon="0" rev="0"/>
+            </a:camera>
+            <a:lightRig rig="threePt" dir="t">
+              <a:rot lat="0" lon="0" rev="1200000"/>
+            </a:lightRig>
+          </a:scene3d>
+          <a:sp3d>
+            <a:bevelT w="63500" h="25400"/>
+          </a:sp3d>
+        </a:effectStyle>
+      </a:effectStyleLst>
+      <a:bgFillStyleLst>
+        <a:solidFill>
+          <a:schemeClr val="phClr"/>
+        </a:solidFill>
+        <a:gradFill rotWithShape="1">
+          <a:gsLst>
+            <a:gs pos="0">
+              <a:schemeClr val="phClr">
+                <a:tint val="40000"/>
+                <a:satMod val="350000"/>
+              </a:schemeClr>
+            </a:gs>
+            <a:gs pos="40000">
+              <a:schemeClr val="phClr">
+                <a:tint val="45000"/>
+                <a:shade val="99000"/>
+                <a:satMod val="350000"/>
+              </a:schemeClr>
+            </a:gs>
+            <a:gs pos="100000">
+              <a:schemeClr val="phClr">
+                <a:shade val="20000"/>
+                <a:satMod val="255000"/>
+              </a:schemeClr>
+            </a:gs>
+          </a:gsLst>
+          <a:path path="circle">
+            <a:fillToRect l="50000" t="-80000" r="50000" b="180000"/>
+          </a:path>
+        </a:gradFill>
+        <a:gradFill rotWithShape="1">
+          <a:gsLst>
+            <a:gs pos="0">
+              <a:schemeClr val="phClr">
+                <a:tint val="80000"/>
+                <a:satMod val="300000"/>
+              </a:schemeClr>
+            </a:gs>
+            <a:gs pos="100000">
+              <a:schemeClr val="phClr">
+                <a:shade val="30000"/>
+                <a:satMod val="200000"/>
+              </a:schemeClr>
+            </a:gs>
+          </a:gsLst>
+          <a:path path="circle">
+            <a:fillToRect l="50000" t="50000" r="50000" b="50000"/>
+          </a:path>
+        </a:gradFill>
+      </a:bgFillStyleLst>
+    </a:fmtScheme>
+  </a:themeElements>
+</a:theme>
+</file>
+
+<file path=ppt/theme/theme2.xml><?xml version="1.0" encoding="utf-8"?>
 <a:theme xmlns:a="http://schemas.openxmlformats.org/drawingml/2006/main" xmlns:r="http://schemas.openxmlformats.org/officeDocument/2006/relationships" name="material">
   <a:themeElements>
     <a:clrScheme name="Material">
@@ -18183,283 +17913,4 @@
     </a:fmtScheme>
   </a:themeElements>
 </a:theme>
-</file>
-
-<file path=ppt/theme/theme2.xml><?xml version="1.0" encoding="utf-8"?>
-<a:theme xmlns:a="http://schemas.openxmlformats.org/drawingml/2006/main" xmlns:r="http://schemas.openxmlformats.org/officeDocument/2006/relationships" name="Custom Theme">
-  <a:themeElements>
-    <a:clrScheme name="Default">
-      <a:dk1>
-        <a:srgbClr val="000000"/>
-      </a:dk1>
-      <a:lt1>
-        <a:srgbClr val="FFFFFF"/>
-      </a:lt1>
-      <a:dk2>
-        <a:srgbClr val="158158"/>
-      </a:dk2>
-      <a:lt2>
-        <a:srgbClr val="F3F3F3"/>
-      </a:lt2>
-      <a:accent1>
-        <a:srgbClr val="058DC7"/>
-      </a:accent1>
-      <a:accent2>
-        <a:srgbClr val="50B432"/>
-      </a:accent2>
-      <a:accent3>
-        <a:srgbClr val="ED561B"/>
-      </a:accent3>
-      <a:accent4>
-        <a:srgbClr val="EDEF00"/>
-      </a:accent4>
-      <a:accent5>
-        <a:srgbClr val="24CBE5"/>
-      </a:accent5>
-      <a:accent6>
-        <a:srgbClr val="64E572"/>
-      </a:accent6>
-      <a:hlink>
-        <a:srgbClr val="2200CC"/>
-      </a:hlink>
-      <a:folHlink>
-        <a:srgbClr val="551A8B"/>
-      </a:folHlink>
-    </a:clrScheme>
-    <a:fontScheme name="Office">
-      <a:majorFont>
-        <a:latin typeface="Arial"/>
-        <a:ea typeface=""/>
-        <a:cs typeface=""/>
-        <a:font script="Jpan" typeface="ＭＳ Ｐゴシック"/>
-        <a:font script="Hang" typeface="맑은 고딕"/>
-        <a:font script="Hans" typeface="宋体"/>
-        <a:font script="Hant" typeface="新細明體"/>
-        <a:font script="Arab" typeface="Times New Roman"/>
-        <a:font script="Hebr" typeface="Times New Roman"/>
-        <a:font script="Thai" typeface="Angsana New"/>
-        <a:font script="Ethi" typeface="Nyala"/>
-        <a:font script="Beng" typeface="Vrinda"/>
-        <a:font script="Gujr" typeface="Shruti"/>
-        <a:font script="Khmr" typeface="MoolBoran"/>
-        <a:font script="Knda" typeface="Tunga"/>
-        <a:font script="Guru" typeface="Raavi"/>
-        <a:font script="Cans" typeface="Euphemia"/>
-        <a:font script="Cher" typeface="Plantagenet Cherokee"/>
-        <a:font script="Yiii" typeface="Microsoft Yi Baiti"/>
-        <a:font script="Tibt" typeface="Microsoft Himalaya"/>
-        <a:font script="Thaa" typeface="MV Boli"/>
-        <a:font script="Deva" typeface="Mangal"/>
-        <a:font script="Telu" typeface="Gautami"/>
-        <a:font script="Taml" typeface="Latha"/>
-        <a:font script="Syrc" typeface="Estrangelo Edessa"/>
-        <a:font script="Orya" typeface="Kalinga"/>
-        <a:font script="Mlym" typeface="Kartika"/>
-        <a:font script="Laoo" typeface="DokChampa"/>
-        <a:font script="Sinh" typeface="Iskoola Pota"/>
-        <a:font script="Mong" typeface="Mongolian Baiti"/>
-        <a:font script="Viet" typeface="Times New Roman"/>
-        <a:font script="Uigh" typeface="Microsoft Uighur"/>
-        <a:font script="Geor" typeface="Sylfaen"/>
-      </a:majorFont>
-      <a:minorFont>
-        <a:latin typeface="Arial"/>
-        <a:ea typeface=""/>
-        <a:cs typeface=""/>
-        <a:font script="Jpan" typeface="ＭＳ Ｐゴシック"/>
-        <a:font script="Hang" typeface="맑은 고딕"/>
-        <a:font script="Hans" typeface="宋体"/>
-        <a:font script="Hant" typeface="新細明體"/>
-        <a:font script="Arab" typeface="Arial"/>
-        <a:font script="Hebr" typeface="Arial"/>
-        <a:font script="Thai" typeface="Cordia New"/>
-        <a:font script="Ethi" typeface="Nyala"/>
-        <a:font script="Beng" typeface="Vrinda"/>
-        <a:font script="Gujr" typeface="Shruti"/>
-        <a:font script="Khmr" typeface="DaunPenh"/>
-        <a:font script="Knda" typeface="Tunga"/>
-        <a:font script="Guru" typeface="Raavi"/>
-        <a:font script="Cans" typeface="Euphemia"/>
-        <a:font script="Cher" typeface="Plantagenet Cherokee"/>
-        <a:font script="Yiii" typeface="Microsoft Yi Baiti"/>
-        <a:font script="Tibt" typeface="Microsoft Himalaya"/>
-        <a:font script="Thaa" typeface="MV Boli"/>
-        <a:font script="Deva" typeface="Mangal"/>
-        <a:font script="Telu" typeface="Gautami"/>
-        <a:font script="Taml" typeface="Latha"/>
-        <a:font script="Syrc" typeface="Estrangelo Edessa"/>
-        <a:font script="Orya" typeface="Kalinga"/>
-        <a:font script="Mlym" typeface="Kartika"/>
-        <a:font script="Laoo" typeface="DokChampa"/>
-        <a:font script="Sinh" typeface="Iskoola Pota"/>
-        <a:font script="Mong" typeface="Mongolian Baiti"/>
-        <a:font script="Viet" typeface="Arial"/>
-        <a:font script="Uigh" typeface="Microsoft Uighur"/>
-        <a:font script="Geor" typeface="Sylfaen"/>
-      </a:minorFont>
-    </a:fontScheme>
-    <a:fmtScheme name="Office">
-      <a:fillStyleLst>
-        <a:solidFill>
-          <a:schemeClr val="phClr"/>
-        </a:solidFill>
-        <a:gradFill rotWithShape="1">
-          <a:gsLst>
-            <a:gs pos="0">
-              <a:schemeClr val="phClr">
-                <a:tint val="50000"/>
-                <a:satMod val="300000"/>
-              </a:schemeClr>
-            </a:gs>
-            <a:gs pos="35000">
-              <a:schemeClr val="phClr">
-                <a:tint val="37000"/>
-                <a:satMod val="300000"/>
-              </a:schemeClr>
-            </a:gs>
-            <a:gs pos="100000">
-              <a:schemeClr val="phClr">
-                <a:tint val="15000"/>
-                <a:satMod val="350000"/>
-              </a:schemeClr>
-            </a:gs>
-          </a:gsLst>
-          <a:lin ang="16200000" scaled="1"/>
-        </a:gradFill>
-        <a:gradFill rotWithShape="1">
-          <a:gsLst>
-            <a:gs pos="0">
-              <a:schemeClr val="phClr">
-                <a:tint val="100000"/>
-                <a:shade val="100000"/>
-                <a:satMod val="130000"/>
-              </a:schemeClr>
-            </a:gs>
-            <a:gs pos="100000">
-              <a:schemeClr val="phClr">
-                <a:tint val="50000"/>
-                <a:shade val="100000"/>
-                <a:satMod val="350000"/>
-              </a:schemeClr>
-            </a:gs>
-          </a:gsLst>
-          <a:lin ang="16200000" scaled="0"/>
-        </a:gradFill>
-      </a:fillStyleLst>
-      <a:lnStyleLst>
-        <a:ln w="9525" cap="flat" cmpd="sng" algn="ctr">
-          <a:solidFill>
-            <a:schemeClr val="phClr">
-              <a:shade val="95000"/>
-              <a:satMod val="105000"/>
-            </a:schemeClr>
-          </a:solidFill>
-          <a:prstDash val="solid"/>
-        </a:ln>
-        <a:ln w="25400" cap="flat" cmpd="sng" algn="ctr">
-          <a:solidFill>
-            <a:schemeClr val="phClr"/>
-          </a:solidFill>
-          <a:prstDash val="solid"/>
-        </a:ln>
-        <a:ln w="38100" cap="flat" cmpd="sng" algn="ctr">
-          <a:solidFill>
-            <a:schemeClr val="phClr"/>
-          </a:solidFill>
-          <a:prstDash val="solid"/>
-        </a:ln>
-      </a:lnStyleLst>
-      <a:effectStyleLst>
-        <a:effectStyle>
-          <a:effectLst>
-            <a:outerShdw blurRad="40000" dist="20000" dir="5400000" rotWithShape="0">
-              <a:srgbClr val="000000">
-                <a:alpha val="38000"/>
-              </a:srgbClr>
-            </a:outerShdw>
-          </a:effectLst>
-        </a:effectStyle>
-        <a:effectStyle>
-          <a:effectLst>
-            <a:outerShdw blurRad="40000" dist="23000" dir="5400000" rotWithShape="0">
-              <a:srgbClr val="000000">
-                <a:alpha val="35000"/>
-              </a:srgbClr>
-            </a:outerShdw>
-          </a:effectLst>
-        </a:effectStyle>
-        <a:effectStyle>
-          <a:effectLst>
-            <a:outerShdw blurRad="40000" dist="23000" dir="5400000" rotWithShape="0">
-              <a:srgbClr val="000000">
-                <a:alpha val="35000"/>
-              </a:srgbClr>
-            </a:outerShdw>
-          </a:effectLst>
-          <a:scene3d>
-            <a:camera prst="orthographicFront">
-              <a:rot lat="0" lon="0" rev="0"/>
-            </a:camera>
-            <a:lightRig rig="threePt" dir="t">
-              <a:rot lat="0" lon="0" rev="1200000"/>
-            </a:lightRig>
-          </a:scene3d>
-          <a:sp3d>
-            <a:bevelT w="63500" h="25400"/>
-          </a:sp3d>
-        </a:effectStyle>
-      </a:effectStyleLst>
-      <a:bgFillStyleLst>
-        <a:solidFill>
-          <a:schemeClr val="phClr"/>
-        </a:solidFill>
-        <a:gradFill rotWithShape="1">
-          <a:gsLst>
-            <a:gs pos="0">
-              <a:schemeClr val="phClr">
-                <a:tint val="40000"/>
-                <a:satMod val="350000"/>
-              </a:schemeClr>
-            </a:gs>
-            <a:gs pos="40000">
-              <a:schemeClr val="phClr">
-                <a:tint val="45000"/>
-                <a:shade val="99000"/>
-                <a:satMod val="350000"/>
-              </a:schemeClr>
-            </a:gs>
-            <a:gs pos="100000">
-              <a:schemeClr val="phClr">
-                <a:shade val="20000"/>
-                <a:satMod val="255000"/>
-              </a:schemeClr>
-            </a:gs>
-          </a:gsLst>
-          <a:path path="circle">
-            <a:fillToRect l="50000" t="-80000" r="50000" b="180000"/>
-          </a:path>
-        </a:gradFill>
-        <a:gradFill rotWithShape="1">
-          <a:gsLst>
-            <a:gs pos="0">
-              <a:schemeClr val="phClr">
-                <a:tint val="80000"/>
-                <a:satMod val="300000"/>
-              </a:schemeClr>
-            </a:gs>
-            <a:gs pos="100000">
-              <a:schemeClr val="phClr">
-                <a:shade val="30000"/>
-                <a:satMod val="200000"/>
-              </a:schemeClr>
-            </a:gs>
-          </a:gsLst>
-          <a:path path="circle">
-            <a:fillToRect l="50000" t="50000" r="50000" b="50000"/>
-          </a:path>
-        </a:gradFill>
-      </a:bgFillStyleLst>
-    </a:fmtScheme>
-  </a:themeElements>
-</a:theme>
 </file>
</xml_diff>